<commit_message>
updating session 5 notes, adding practical 5
</commit_message>
<xml_diff>
--- a/Chanco_ST6103_GLM_2019_Henrion_Session5.pptx
+++ b/Chanco_ST6103_GLM_2019_Henrion_Session5.pptx
@@ -8853,12 +8853,19 @@
                 </a:r>
                 <a14:m>
                   <m:oMath xmlns:m="http://schemas.openxmlformats.org/officeDocument/2006/math">
-                    <m:r>
-                      <m:rPr>
-                        <m:sty m:val="b"/>
-                      </m:rPr>
-                      <m:t>β</m:t>
-                    </m:r>
+                    <m:acc>
+                      <m:accPr>
+                        <m:chr m:val="̂"/>
+                      </m:accPr>
+                      <m:e>
+                        <m:r>
+                          <m:rPr>
+                            <m:sty m:val="b"/>
+                          </m:rPr>
+                          <m:t>β</m:t>
+                        </m:r>
+                      </m:e>
+                    </m:acc>
                   </m:oMath>
                 </a14:m>
                 <a:r>
@@ -8935,12 +8942,19 @@
                 </a:r>
                 <a14:m>
                   <m:oMath xmlns:m="http://schemas.openxmlformats.org/officeDocument/2006/math">
-                    <m:r>
-                      <m:rPr>
-                        <m:sty m:val="b"/>
-                      </m:rPr>
-                      <m:t>β</m:t>
-                    </m:r>
+                    <m:acc>
+                      <m:accPr>
+                        <m:chr m:val="̂"/>
+                      </m:accPr>
+                      <m:e>
+                        <m:r>
+                          <m:rPr>
+                            <m:sty m:val="b"/>
+                          </m:rPr>
+                          <m:t>β</m:t>
+                        </m:r>
+                      </m:e>
+                    </m:acc>
                     <m:r>
                       <m:t>−</m:t>
                     </m:r>
@@ -11256,6 +11270,40 @@
                   <a:buNone/>
                 </a:pPr>
                 <a:r>
+                  <a:rPr/>
+                  <a:t>The best approach is to discuss </a:t>
+                </a:r>
+                <a:r>
+                  <a:rPr i="1"/>
+                  <a:t>a priori</a:t>
+                </a:r>
+                <a:r>
+                  <a:rPr/>
+                  <a:t> with experts in the field in which the data have been collected and ask them what should be included in the model. Then base your inference only on that single model you fitted. Keep variables even if they have non-significant coefficients. E.g. predictions can still benefit from non-significant variables in the model.</a:t>
+                </a:r>
+              </a:p>
+              <a:p>
+                <a:pPr lvl="0" marL="0" indent="0">
+                  <a:buNone/>
+                </a:pPr>
+                <a14:m>
+                  <m:oMathPara xmlns:m="http://schemas.openxmlformats.org/officeDocument/2006/math">
+                    <m:oMathParaPr>
+                      <m:jc m:val="center"/>
+                    </m:oMathParaPr>
+                    <m:oMath>
+                      <m:r>
+                        <m:t> </m:t>
+                      </m:r>
+                    </m:oMath>
+                  </m:oMathPara>
+                </a14:m>
+              </a:p>
+              <a:p>
+                <a:pPr lvl="0" marL="0" indent="0">
+                  <a:buNone/>
+                </a:pPr>
+                <a:r>
                   <a:rPr b="1"/>
                   <a:t>Regularisation techniques</a:t>
                 </a:r>
@@ -11266,6 +11314,14 @@
                 <a:r>
                   <a:rPr b="1"/>
                   <a:t>elastic net</a:t>
+                </a:r>
+                <a:r>
+                  <a:rPr/>
+                  <a:t>, </a:t>
+                </a:r>
+                <a:r>
+                  <a:rPr b="1"/>
+                  <a:t>ridge regression</a:t>
                 </a:r>
                 <a:r>
                   <a:rPr/>

</xml_diff>